<commit_message>
works better, improve loader a bit + adjust to actual data
</commit_message>
<xml_diff>
--- a/templates/template.pptx
+++ b/templates/template.pptx
@@ -5597,14 +5597,14 @@
           <p:nvPr>
             <p:extLst>
               <p:ext uri="{D42A27DB-BD31-4B8C-83A1-F6EECF244321}">
-                <p14:modId xmlns:p14="http://schemas.microsoft.com/office/powerpoint/2010/main" val="453053287"/>
+                <p14:modId xmlns:p14="http://schemas.microsoft.com/office/powerpoint/2010/main" val="1821062524"/>
               </p:ext>
             </p:extLst>
           </p:nvPr>
         </p:nvGraphicFramePr>
         <p:xfrm>
           <a:off x="2994350" y="986151"/>
-          <a:ext cx="5888900" cy="3383048"/>
+          <a:ext cx="5888900" cy="3434844"/>
         </p:xfrm>
         <a:graphic>
           <a:graphicData uri="http://schemas.openxmlformats.org/drawingml/2006/table">
@@ -5658,7 +5658,43 @@
                           <a:cs typeface="Lexend"/>
                           <a:sym typeface="Lexend"/>
                         </a:rPr>
-                        <a:t>Colgate nowości / AdInsert Plus</a:t>
+                        <a:t>{</a:t>
+                      </a:r>
+                      <a:r>
+                        <a:rPr lang="pl-PL" sz="1000" b="1" dirty="0" err="1">
+                          <a:latin typeface="Lexend"/>
+                          <a:ea typeface="Lexend"/>
+                          <a:cs typeface="Lexend"/>
+                          <a:sym typeface="Lexend"/>
+                        </a:rPr>
+                        <a:t>campaignName</a:t>
+                      </a:r>
+                      <a:r>
+                        <a:rPr lang="pl" sz="1000" b="1" dirty="0">
+                          <a:latin typeface="Lexend"/>
+                          <a:ea typeface="Lexend"/>
+                          <a:cs typeface="Lexend"/>
+                          <a:sym typeface="Lexend"/>
+                        </a:rPr>
+                        <a:t>} /{</a:t>
+                      </a:r>
+                      <a:r>
+                        <a:rPr lang="pl-PL" sz="1000" b="1" dirty="0">
+                          <a:latin typeface="Lexend"/>
+                          <a:ea typeface="Lexend"/>
+                          <a:cs typeface="Lexend"/>
+                          <a:sym typeface="Lexend"/>
+                        </a:rPr>
+                        <a:t>format</a:t>
+                      </a:r>
+                      <a:r>
+                        <a:rPr lang="pl" sz="1000" b="1" dirty="0">
+                          <a:latin typeface="Lexend"/>
+                          <a:ea typeface="Lexend"/>
+                          <a:cs typeface="Lexend"/>
+                          <a:sym typeface="Lexend"/>
+                        </a:rPr>
+                        <a:t>}</a:t>
                       </a:r>
                       <a:endParaRPr sz="1000" b="1" dirty="0">
                         <a:latin typeface="Lexend"/>
@@ -5728,13 +5764,31 @@
                         <a:buNone/>
                       </a:pPr>
                       <a:r>
-                        <a:rPr lang="pl" sz="1000" b="1" dirty="0">
+                        <a:rPr lang="pl-PL" sz="1000" b="1" dirty="0">
                           <a:latin typeface="Lexend"/>
                           <a:ea typeface="Lexend"/>
                           <a:cs typeface="Lexend"/>
                           <a:sym typeface="Lexend"/>
                         </a:rPr>
-                        <a:t>4-31.07.2024</a:t>
+                        <a:t>{</a:t>
+                      </a:r>
+                      <a:r>
+                        <a:rPr lang="pl-PL" sz="1000" b="1" dirty="0" err="1">
+                          <a:latin typeface="Lexend"/>
+                          <a:ea typeface="Lexend"/>
+                          <a:cs typeface="Lexend"/>
+                          <a:sym typeface="Lexend"/>
+                        </a:rPr>
+                        <a:t>date</a:t>
+                      </a:r>
+                      <a:r>
+                        <a:rPr lang="pl-PL" sz="1000" b="1" dirty="0">
+                          <a:latin typeface="Lexend"/>
+                          <a:ea typeface="Lexend"/>
+                          <a:cs typeface="Lexend"/>
+                          <a:sym typeface="Lexend"/>
+                        </a:rPr>
+                        <a:t>}</a:t>
                       </a:r>
                       <a:endParaRPr sz="1000" b="1" dirty="0">
                         <a:latin typeface="Lexend"/>
@@ -6181,7 +6235,7 @@
                           <a:cs typeface="Lexend"/>
                           <a:sym typeface="Lexend"/>
                         </a:rPr>
-                        <a:t>112 200</a:t>
+                        <a:t>{goal}</a:t>
                       </a:r>
                       <a:endParaRPr sz="1000" b="1" dirty="0">
                         <a:latin typeface="Lexend"/>
@@ -6249,13 +6303,13 @@
                         <a:buNone/>
                       </a:pPr>
                       <a:r>
-                        <a:rPr lang="pl" sz="1000" b="1" dirty="0">
+                        <a:rPr lang="pl" sz="1000" b="1">
                           <a:latin typeface="Lexend"/>
                           <a:ea typeface="Lexend"/>
                           <a:cs typeface="Lexend"/>
                           <a:sym typeface="Lexend"/>
                         </a:rPr>
-                        <a:t>{totalImpressions1}</a:t>
+                        <a:t>{totalImpressions}</a:t>
                       </a:r>
                       <a:endParaRPr sz="1000" b="1" dirty="0">
                         <a:latin typeface="Lexend"/>
@@ -6284,7 +6338,31 @@
                           <a:cs typeface="Lexend"/>
                           <a:sym typeface="Lexend"/>
                         </a:rPr>
-                        <a:t>(108% realizacji)</a:t>
+                        <a:t>({</a:t>
+                      </a:r>
+                      <a:r>
+                        <a:rPr lang="pl-PL" sz="1000" b="1" dirty="0" err="1">
+                          <a:solidFill>
+                            <a:srgbClr val="3CB451"/>
+                          </a:solidFill>
+                          <a:latin typeface="Lexend"/>
+                          <a:ea typeface="Lexend"/>
+                          <a:cs typeface="Lexend"/>
+                          <a:sym typeface="Lexend"/>
+                        </a:rPr>
+                        <a:t>realizationPercent</a:t>
+                      </a:r>
+                      <a:r>
+                        <a:rPr lang="pl" sz="1000" b="1" dirty="0">
+                          <a:solidFill>
+                            <a:srgbClr val="3CB451"/>
+                          </a:solidFill>
+                          <a:latin typeface="Lexend"/>
+                          <a:ea typeface="Lexend"/>
+                          <a:cs typeface="Lexend"/>
+                          <a:sym typeface="Lexend"/>
+                        </a:rPr>
+                        <a:t>} realizacji)</a:t>
                       </a:r>
                       <a:endParaRPr sz="1000" b="1" dirty="0">
                         <a:solidFill>
@@ -6506,7 +6584,7 @@
                         <a:buNone/>
                       </a:pPr>
                       <a:r>
-                        <a:rPr lang="pl" sz="1000" b="1" dirty="0">
+                        <a:rPr lang="pl-PL" sz="1000" b="1" dirty="0">
                           <a:solidFill>
                             <a:schemeClr val="dk1"/>
                           </a:solidFill>
@@ -6515,7 +6593,31 @@
                           <a:cs typeface="Lexend"/>
                           <a:sym typeface="Lexend"/>
                         </a:rPr>
-                        <a:t>4 161</a:t>
+                        <a:t>{</a:t>
+                      </a:r>
+                      <a:r>
+                        <a:rPr lang="pl-PL" sz="1000" b="1" dirty="0" err="1">
+                          <a:solidFill>
+                            <a:schemeClr val="dk1"/>
+                          </a:solidFill>
+                          <a:latin typeface="Lexend"/>
+                          <a:ea typeface="Lexend"/>
+                          <a:cs typeface="Lexend"/>
+                          <a:sym typeface="Lexend"/>
+                        </a:rPr>
+                        <a:t>totalClicks</a:t>
+                      </a:r>
+                      <a:r>
+                        <a:rPr lang="pl-PL" sz="1000" b="1" dirty="0">
+                          <a:solidFill>
+                            <a:schemeClr val="dk1"/>
+                          </a:solidFill>
+                          <a:latin typeface="Lexend"/>
+                          <a:ea typeface="Lexend"/>
+                          <a:cs typeface="Lexend"/>
+                          <a:sym typeface="Lexend"/>
+                        </a:rPr>
+                        <a:t>}</a:t>
                       </a:r>
                       <a:endParaRPr sz="1000" b="1" dirty="0">
                         <a:solidFill>
@@ -6743,7 +6845,25 @@
                           <a:cs typeface="Lexend"/>
                           <a:sym typeface="Lexend"/>
                         </a:rPr>
-                        <a:t>{uniqueImpressions1}</a:t>
+                        <a:t>{</a:t>
+                      </a:r>
+                      <a:r>
+                        <a:rPr lang="pl-PL" sz="1000" b="1" dirty="0" err="1">
+                          <a:latin typeface="Lexend"/>
+                          <a:ea typeface="Lexend"/>
+                          <a:cs typeface="Lexend"/>
+                          <a:sym typeface="Lexend"/>
+                        </a:rPr>
+                        <a:t>uniqueImpressions</a:t>
+                      </a:r>
+                      <a:r>
+                        <a:rPr lang="pl-PL" sz="1000" b="1" dirty="0">
+                          <a:latin typeface="Lexend"/>
+                          <a:ea typeface="Lexend"/>
+                          <a:cs typeface="Lexend"/>
+                          <a:sym typeface="Lexend"/>
+                        </a:rPr>
+                        <a:t>}</a:t>
                       </a:r>
                       <a:endParaRPr sz="1000" b="1" dirty="0">
                         <a:latin typeface="Lexend"/>
@@ -6818,7 +6938,7 @@
                         <a:buNone/>
                       </a:pPr>
                       <a:r>
-                        <a:rPr lang="pl" sz="1000">
+                        <a:rPr lang="pl" sz="1000" dirty="0">
                           <a:latin typeface="Lexend ExtraLight"/>
                           <a:ea typeface="Lexend ExtraLight"/>
                           <a:cs typeface="Lexend ExtraLight"/>
@@ -6826,7 +6946,7 @@
                         </a:rPr>
                         <a:t>Częstotliwość kontaktu z reklamą</a:t>
                       </a:r>
-                      <a:endParaRPr sz="1000">
+                      <a:endParaRPr sz="1000" dirty="0">
                         <a:latin typeface="Lexend ExtraLight"/>
                         <a:ea typeface="Lexend ExtraLight"/>
                         <a:cs typeface="Lexend ExtraLight"/>
@@ -6969,7 +7089,31 @@
                           <a:cs typeface="Lexend"/>
                           <a:sym typeface="Lexend"/>
                         </a:rPr>
-                        <a:t>1,7</a:t>
+                        <a:t>{</a:t>
+                      </a:r>
+                      <a:r>
+                        <a:rPr lang="pl-PL" sz="1000" b="1" dirty="0" err="1">
+                          <a:solidFill>
+                            <a:schemeClr val="dk1"/>
+                          </a:solidFill>
+                          <a:latin typeface="Lexend"/>
+                          <a:ea typeface="Lexend"/>
+                          <a:cs typeface="Lexend"/>
+                          <a:sym typeface="Lexend"/>
+                        </a:rPr>
+                        <a:t>frequency</a:t>
+                      </a:r>
+                      <a:r>
+                        <a:rPr lang="pl" sz="1000" b="1" dirty="0">
+                          <a:solidFill>
+                            <a:schemeClr val="dk1"/>
+                          </a:solidFill>
+                          <a:latin typeface="Lexend"/>
+                          <a:ea typeface="Lexend"/>
+                          <a:cs typeface="Lexend"/>
+                          <a:sym typeface="Lexend"/>
+                        </a:rPr>
+                        <a:t>}</a:t>
                       </a:r>
                       <a:endParaRPr sz="1000" b="1" dirty="0">
                         <a:solidFill>
@@ -7132,7 +7276,31 @@
                           <a:cs typeface="Lexend"/>
                           <a:sym typeface="Lexend"/>
                         </a:rPr>
-                        <a:t>3,33%*</a:t>
+                        <a:t>{</a:t>
+                      </a:r>
+                      <a:r>
+                        <a:rPr lang="pl-PL" sz="1000" b="1" dirty="0">
+                          <a:solidFill>
+                            <a:schemeClr val="dk1"/>
+                          </a:solidFill>
+                          <a:latin typeface="Lexend"/>
+                          <a:ea typeface="Lexend"/>
+                          <a:cs typeface="Lexend"/>
+                          <a:sym typeface="Lexend"/>
+                        </a:rPr>
+                        <a:t>benchmark</a:t>
+                      </a:r>
+                      <a:r>
+                        <a:rPr lang="pl" sz="1000" b="1" dirty="0">
+                          <a:solidFill>
+                            <a:schemeClr val="dk1"/>
+                          </a:solidFill>
+                          <a:latin typeface="Lexend"/>
+                          <a:ea typeface="Lexend"/>
+                          <a:cs typeface="Lexend"/>
+                          <a:sym typeface="Lexend"/>
+                        </a:rPr>
+                        <a:t>}*</a:t>
                       </a:r>
                       <a:endParaRPr sz="1000" b="1" dirty="0">
                         <a:latin typeface="Lexend"/>
@@ -7216,17 +7384,32 @@
                           <a:cs typeface="Lexend"/>
                           <a:sym typeface="Lexend"/>
                         </a:rPr>
-                        <a:t>3,42%</a:t>
+                        <a:t>{</a:t>
                       </a:r>
-                      <a:endParaRPr sz="1000" b="1" dirty="0">
-                        <a:solidFill>
-                          <a:schemeClr val="dk1"/>
-                        </a:solidFill>
-                        <a:latin typeface="Lexend"/>
-                        <a:ea typeface="Lexend"/>
-                        <a:cs typeface="Lexend"/>
-                        <a:sym typeface="Lexend"/>
-                      </a:endParaRPr>
+                      <a:r>
+                        <a:rPr lang="pl-PL" sz="1000" b="1" dirty="0" err="1">
+                          <a:solidFill>
+                            <a:schemeClr val="dk1"/>
+                          </a:solidFill>
+                          <a:latin typeface="Lexend"/>
+                          <a:ea typeface="Lexend"/>
+                          <a:cs typeface="Lexend"/>
+                          <a:sym typeface="Lexend"/>
+                        </a:rPr>
+                        <a:t>ctr</a:t>
+                      </a:r>
+                      <a:r>
+                        <a:rPr lang="pl" sz="1000" b="1" dirty="0">
+                          <a:solidFill>
+                            <a:schemeClr val="dk1"/>
+                          </a:solidFill>
+                          <a:latin typeface="Lexend"/>
+                          <a:ea typeface="Lexend"/>
+                          <a:cs typeface="Lexend"/>
+                          <a:sym typeface="Lexend"/>
+                        </a:rPr>
+                        <a:t>}</a:t>
+                      </a:r>
                     </a:p>
                     <a:p>
                       <a:pPr marL="0" lvl="0" indent="0" algn="r" rtl="0">
@@ -7246,16 +7429,19 @@
                       <a:r>
                         <a:rPr lang="pl" sz="1000" b="1" dirty="0">
                           <a:solidFill>
-                            <a:srgbClr val="3CB451"/>
+                            <a:schemeClr val="dk1"/>
                           </a:solidFill>
                           <a:latin typeface="Lexend"/>
                           <a:ea typeface="Lexend"/>
                           <a:cs typeface="Lexend"/>
                           <a:sym typeface="Lexend"/>
                         </a:rPr>
-                        <a:t>(+0,09 p.p.)</a:t>
+                        <a:t>{pp}</a:t>
                       </a:r>
                       <a:endParaRPr sz="1000" b="1" dirty="0">
+                        <a:solidFill>
+                          <a:schemeClr val="dk1"/>
+                        </a:solidFill>
                         <a:latin typeface="Lexend"/>
                         <a:ea typeface="Lexend"/>
                         <a:cs typeface="Lexend"/>
@@ -7614,7 +7800,7 @@
               <a:buNone/>
             </a:pPr>
             <a:r>
-              <a:rPr lang="pl" sz="800" dirty="0">
+              <a:rPr lang="pl-PL" sz="800" dirty="0">
                 <a:solidFill>
                   <a:schemeClr val="lt1"/>
                 </a:solidFill>
@@ -7623,17 +7809,32 @@
                 <a:cs typeface="Lexend ExtraLight"/>
                 <a:sym typeface="Lexend ExtraLight"/>
               </a:rPr>
-              <a:t>*Benchmark dla formatu AdInsert Plus w kategorii Pasty do zębów </a:t>
+              <a:t>*Benchmark dla formatu {format} w kategorii {</a:t>
             </a:r>
-            <a:endParaRPr sz="800" dirty="0">
-              <a:solidFill>
-                <a:schemeClr val="lt1"/>
-              </a:solidFill>
-              <a:latin typeface="Lexend ExtraLight"/>
-              <a:ea typeface="Lexend ExtraLight"/>
-              <a:cs typeface="Lexend ExtraLight"/>
-              <a:sym typeface="Lexend ExtraLight"/>
-            </a:endParaRPr>
+            <a:r>
+              <a:rPr lang="pl-PL" sz="800" dirty="0" err="1">
+                <a:solidFill>
+                  <a:schemeClr val="lt1"/>
+                </a:solidFill>
+                <a:latin typeface="Lexend ExtraLight"/>
+                <a:ea typeface="Lexend ExtraLight"/>
+                <a:cs typeface="Lexend ExtraLight"/>
+                <a:sym typeface="Lexend ExtraLight"/>
+              </a:rPr>
+              <a:t>category</a:t>
+            </a:r>
+            <a:r>
+              <a:rPr lang="pl-PL" sz="800" dirty="0">
+                <a:solidFill>
+                  <a:schemeClr val="lt1"/>
+                </a:solidFill>
+                <a:latin typeface="Lexend ExtraLight"/>
+                <a:ea typeface="Lexend ExtraLight"/>
+                <a:cs typeface="Lexend ExtraLight"/>
+                <a:sym typeface="Lexend ExtraLight"/>
+              </a:rPr>
+              <a:t>}</a:t>
+            </a:r>
           </a:p>
         </p:txBody>
       </p:sp>
@@ -7730,9 +7931,10 @@
           <a:lstStyle/>
           <a:p>
             <a:r>
-              <a:rPr lang="pl-PL" dirty="0"/>
-              <a:t>{%image1}</a:t>
+              <a:rPr lang="pl-PL"/>
+              <a:t>{%image}</a:t>
             </a:r>
+            <a:endParaRPr lang="pl-PL" dirty="0"/>
           </a:p>
         </p:txBody>
       </p:sp>

</xml_diff>